<commit_message>
Live daten bekommen von Fronius Solarweb
</commit_message>
<xml_diff>
--- a/Documents/PVV-Visualizer.pptx
+++ b/Documents/PVV-Visualizer.pptx
@@ -22,7 +22,6 @@
     <p:sldId id="298" r:id="rId16"/>
     <p:sldId id="299" r:id="rId17"/>
     <p:sldId id="300" r:id="rId18"/>
-    <p:sldId id="301" r:id="rId19"/>
   </p:sldIdLst>
   <p:sldSz cx="12192000" cy="6858000"/>
   <p:notesSz cx="6858000" cy="9144000"/>
@@ -143,7 +142,6 @@
             <p14:sldId id="298"/>
             <p14:sldId id="299"/>
             <p14:sldId id="300"/>
-            <p14:sldId id="301"/>
           </p14:sldIdLst>
         </p14:section>
       </p14:sectionLst>
@@ -158,7 +156,7 @@
 <file path=ppt/revisionInfo.xml><?xml version="1.0" encoding="utf-8"?>
 <p1510:revInfo xmlns:a="http://schemas.openxmlformats.org/drawingml/2006/main" xmlns:r="http://schemas.openxmlformats.org/officeDocument/2006/relationships" xmlns:p1510="http://schemas.microsoft.com/office/powerpoint/2015/10/main">
   <p1510:revLst>
-    <p1510:client id="{AB865978-72DF-4393-BA79-AF447691D77D}" v="617" dt="2022-11-25T15:02:28.339"/>
+    <p1510:client id="{791C457C-DB6C-4FD1-9AF4-07D803CE15F9}" v="1" dt="2023-01-26T14:14:00.128"/>
   </p1510:revLst>
 </p1510:revInfo>
 </file>
@@ -2375,6 +2373,116 @@
       </pc:sldChg>
     </pc:docChg>
   </pc:docChgLst>
+  <pc:docChgLst>
+    <pc:chgData name="Antonio Peric" userId="68157115d40ac8e2" providerId="LiveId" clId="{791C457C-DB6C-4FD1-9AF4-07D803CE15F9}"/>
+    <pc:docChg chg="undo custSel delSld modSld modSection">
+      <pc:chgData name="Antonio Peric" userId="68157115d40ac8e2" providerId="LiveId" clId="{791C457C-DB6C-4FD1-9AF4-07D803CE15F9}" dt="2023-01-26T14:16:26.449" v="14" actId="1076"/>
+      <pc:docMkLst>
+        <pc:docMk/>
+      </pc:docMkLst>
+      <pc:sldChg chg="addSp delSp modSp mod setBg">
+        <pc:chgData name="Antonio Peric" userId="68157115d40ac8e2" providerId="LiveId" clId="{791C457C-DB6C-4FD1-9AF4-07D803CE15F9}" dt="2023-01-26T14:16:26.449" v="14" actId="1076"/>
+        <pc:sldMkLst>
+          <pc:docMk/>
+          <pc:sldMk cId="155697871" sldId="296"/>
+        </pc:sldMkLst>
+        <pc:spChg chg="mod ord">
+          <ac:chgData name="Antonio Peric" userId="68157115d40ac8e2" providerId="LiveId" clId="{791C457C-DB6C-4FD1-9AF4-07D803CE15F9}" dt="2023-01-26T14:16:21.247" v="12" actId="26606"/>
+          <ac:spMkLst>
+            <pc:docMk/>
+            <pc:sldMk cId="155697871" sldId="296"/>
+            <ac:spMk id="8" creationId="{9FCDBDDB-CCC3-B34F-29AB-99F1E81F4985}"/>
+          </ac:spMkLst>
+        </pc:spChg>
+        <pc:spChg chg="add del">
+          <ac:chgData name="Antonio Peric" userId="68157115d40ac8e2" providerId="LiveId" clId="{791C457C-DB6C-4FD1-9AF4-07D803CE15F9}" dt="2023-01-26T14:16:21.247" v="12" actId="26606"/>
+          <ac:spMkLst>
+            <pc:docMk/>
+            <pc:sldMk cId="155697871" sldId="296"/>
+            <ac:spMk id="11" creationId="{3CECA2BE-0443-493F-9413-FC132026C29F}"/>
+          </ac:spMkLst>
+        </pc:spChg>
+        <pc:spChg chg="add del">
+          <ac:chgData name="Antonio Peric" userId="68157115d40ac8e2" providerId="LiveId" clId="{791C457C-DB6C-4FD1-9AF4-07D803CE15F9}" dt="2023-01-26T14:16:21.247" v="12" actId="26606"/>
+          <ac:spMkLst>
+            <pc:docMk/>
+            <pc:sldMk cId="155697871" sldId="296"/>
+            <ac:spMk id="12" creationId="{57C3041F-18C8-4A3F-BB74-556AD2101858}"/>
+          </ac:spMkLst>
+        </pc:spChg>
+        <pc:spChg chg="add del">
+          <ac:chgData name="Antonio Peric" userId="68157115d40ac8e2" providerId="LiveId" clId="{791C457C-DB6C-4FD1-9AF4-07D803CE15F9}" dt="2023-01-26T14:16:21.247" v="12" actId="26606"/>
+          <ac:spMkLst>
+            <pc:docMk/>
+            <pc:sldMk cId="155697871" sldId="296"/>
+            <ac:spMk id="14" creationId="{72B28B90-B579-47ED-A625-BAD03AE6C0E5}"/>
+          </ac:spMkLst>
+        </pc:spChg>
+        <pc:picChg chg="add mod ord">
+          <ac:chgData name="Antonio Peric" userId="68157115d40ac8e2" providerId="LiveId" clId="{791C457C-DB6C-4FD1-9AF4-07D803CE15F9}" dt="2023-01-26T14:16:26.449" v="14" actId="1076"/>
+          <ac:picMkLst>
+            <pc:docMk/>
+            <pc:sldMk cId="155697871" sldId="296"/>
+            <ac:picMk id="3" creationId="{DE823BE1-B315-B841-9B0C-8779D3318B35}"/>
+          </ac:picMkLst>
+        </pc:picChg>
+        <pc:picChg chg="del">
+          <ac:chgData name="Antonio Peric" userId="68157115d40ac8e2" providerId="LiveId" clId="{791C457C-DB6C-4FD1-9AF4-07D803CE15F9}" dt="2023-01-26T14:15:19.959" v="9" actId="478"/>
+          <ac:picMkLst>
+            <pc:docMk/>
+            <pc:sldMk cId="155697871" sldId="296"/>
+            <ac:picMk id="7" creationId="{9E46624F-803D-EEC3-77DD-BEF9C56E9269}"/>
+          </ac:picMkLst>
+        </pc:picChg>
+        <pc:cxnChg chg="add del">
+          <ac:chgData name="Antonio Peric" userId="68157115d40ac8e2" providerId="LiveId" clId="{791C457C-DB6C-4FD1-9AF4-07D803CE15F9}" dt="2023-01-26T14:16:21.247" v="12" actId="26606"/>
+          <ac:cxnSpMkLst>
+            <pc:docMk/>
+            <pc:sldMk cId="155697871" sldId="296"/>
+            <ac:cxnSpMk id="10" creationId="{EAD4CCDA-06BF-4D2A-B44F-195AEC0B5B22}"/>
+          </ac:cxnSpMkLst>
+        </pc:cxnChg>
+        <pc:cxnChg chg="add del">
+          <ac:chgData name="Antonio Peric" userId="68157115d40ac8e2" providerId="LiveId" clId="{791C457C-DB6C-4FD1-9AF4-07D803CE15F9}" dt="2023-01-26T14:16:21.247" v="12" actId="26606"/>
+          <ac:cxnSpMkLst>
+            <pc:docMk/>
+            <pc:sldMk cId="155697871" sldId="296"/>
+            <ac:cxnSpMk id="21" creationId="{16BEECB0-0766-4C59-B86E-5D26B7D8EF4D}"/>
+          </ac:cxnSpMkLst>
+        </pc:cxnChg>
+      </pc:sldChg>
+      <pc:sldChg chg="addSp delSp modSp mod">
+        <pc:chgData name="Antonio Peric" userId="68157115d40ac8e2" providerId="LiveId" clId="{791C457C-DB6C-4FD1-9AF4-07D803CE15F9}" dt="2023-01-26T14:15:12.074" v="7" actId="1076"/>
+        <pc:sldMkLst>
+          <pc:docMk/>
+          <pc:sldMk cId="1700562641" sldId="300"/>
+        </pc:sldMkLst>
+        <pc:picChg chg="add mod ord">
+          <ac:chgData name="Antonio Peric" userId="68157115d40ac8e2" providerId="LiveId" clId="{791C457C-DB6C-4FD1-9AF4-07D803CE15F9}" dt="2023-01-26T14:15:12.074" v="7" actId="1076"/>
+          <ac:picMkLst>
+            <pc:docMk/>
+            <pc:sldMk cId="1700562641" sldId="300"/>
+            <ac:picMk id="2" creationId="{ECD144AF-C713-4AA6-F670-0AA758C90973}"/>
+          </ac:picMkLst>
+        </pc:picChg>
+        <pc:picChg chg="del">
+          <ac:chgData name="Antonio Peric" userId="68157115d40ac8e2" providerId="LiveId" clId="{791C457C-DB6C-4FD1-9AF4-07D803CE15F9}" dt="2023-01-26T14:13:53.912" v="0" actId="478"/>
+          <ac:picMkLst>
+            <pc:docMk/>
+            <pc:sldMk cId="1700562641" sldId="300"/>
+            <ac:picMk id="5" creationId="{F6BCF78B-35EF-70AF-0A79-B209EE7D00E4}"/>
+          </ac:picMkLst>
+        </pc:picChg>
+      </pc:sldChg>
+      <pc:sldChg chg="del">
+        <pc:chgData name="Antonio Peric" userId="68157115d40ac8e2" providerId="LiveId" clId="{791C457C-DB6C-4FD1-9AF4-07D803CE15F9}" dt="2023-01-26T14:15:16.710" v="8" actId="47"/>
+        <pc:sldMkLst>
+          <pc:docMk/>
+          <pc:sldMk cId="1509675491" sldId="301"/>
+        </pc:sldMkLst>
+      </pc:sldChg>
+    </pc:docChg>
+  </pc:docChgLst>
 </pc:chgInfo>
 </file>
 
@@ -2529,7 +2637,7 @@
           <a:p>
             <a:fld id="{326951E3-958F-4611-B170-D081BA0250F9}" type="datetimeFigureOut">
               <a:rPr lang="en-US" smtClean="0"/>
-              <a:t>11/25/2022</a:t>
+              <a:t>1/26/2023</a:t>
             </a:fld>
             <a:endParaRPr lang="en-US"/>
           </a:p>
@@ -2583,7 +2691,7 @@
           <a:p>
             <a:fld id="{57871EFB-7B9E-4E86-A89E-697E8EBB06F2}" type="slidenum">
               <a:rPr lang="en-US" smtClean="0"/>
-              <a:t>‹#›</a:t>
+              <a:t>‹Nr.›</a:t>
             </a:fld>
             <a:endParaRPr lang="en-US"/>
           </a:p>
@@ -2727,7 +2835,7 @@
           <a:p>
             <a:fld id="{326951E3-958F-4611-B170-D081BA0250F9}" type="datetimeFigureOut">
               <a:rPr lang="en-US" smtClean="0"/>
-              <a:t>11/25/2022</a:t>
+              <a:t>1/26/2023</a:t>
             </a:fld>
             <a:endParaRPr lang="en-US"/>
           </a:p>
@@ -2781,7 +2889,7 @@
           <a:p>
             <a:fld id="{57871EFB-7B9E-4E86-A89E-697E8EBB06F2}" type="slidenum">
               <a:rPr lang="en-US" smtClean="0"/>
-              <a:t>‹#›</a:t>
+              <a:t>‹Nr.›</a:t>
             </a:fld>
             <a:endParaRPr lang="en-US"/>
           </a:p>
@@ -2935,7 +3043,7 @@
           <a:p>
             <a:fld id="{326951E3-958F-4611-B170-D081BA0250F9}" type="datetimeFigureOut">
               <a:rPr lang="en-US" smtClean="0"/>
-              <a:t>11/25/2022</a:t>
+              <a:t>1/26/2023</a:t>
             </a:fld>
             <a:endParaRPr lang="en-US"/>
           </a:p>
@@ -2989,7 +3097,7 @@
           <a:p>
             <a:fld id="{57871EFB-7B9E-4E86-A89E-697E8EBB06F2}" type="slidenum">
               <a:rPr lang="en-US" smtClean="0"/>
-              <a:t>‹#›</a:t>
+              <a:t>‹Nr.›</a:t>
             </a:fld>
             <a:endParaRPr lang="en-US"/>
           </a:p>
@@ -3133,7 +3241,7 @@
           <a:p>
             <a:fld id="{326951E3-958F-4611-B170-D081BA0250F9}" type="datetimeFigureOut">
               <a:rPr lang="en-US" smtClean="0"/>
-              <a:t>11/25/2022</a:t>
+              <a:t>1/26/2023</a:t>
             </a:fld>
             <a:endParaRPr lang="en-US"/>
           </a:p>
@@ -3187,7 +3295,7 @@
           <a:p>
             <a:fld id="{57871EFB-7B9E-4E86-A89E-697E8EBB06F2}" type="slidenum">
               <a:rPr lang="en-US" smtClean="0"/>
-              <a:t>‹#›</a:t>
+              <a:t>‹Nr.›</a:t>
             </a:fld>
             <a:endParaRPr lang="en-US"/>
           </a:p>
@@ -3410,7 +3518,7 @@
           <a:p>
             <a:fld id="{326951E3-958F-4611-B170-D081BA0250F9}" type="datetimeFigureOut">
               <a:rPr lang="en-US" smtClean="0"/>
-              <a:t>11/25/2022</a:t>
+              <a:t>1/26/2023</a:t>
             </a:fld>
             <a:endParaRPr lang="en-US"/>
           </a:p>
@@ -3464,7 +3572,7 @@
           <a:p>
             <a:fld id="{57871EFB-7B9E-4E86-A89E-697E8EBB06F2}" type="slidenum">
               <a:rPr lang="en-US" smtClean="0"/>
-              <a:t>‹#›</a:t>
+              <a:t>‹Nr.›</a:t>
             </a:fld>
             <a:endParaRPr lang="en-US"/>
           </a:p>
@@ -3675,7 +3783,7 @@
           <a:p>
             <a:fld id="{326951E3-958F-4611-B170-D081BA0250F9}" type="datetimeFigureOut">
               <a:rPr lang="en-US" smtClean="0"/>
-              <a:t>11/25/2022</a:t>
+              <a:t>1/26/2023</a:t>
             </a:fld>
             <a:endParaRPr lang="en-US"/>
           </a:p>
@@ -3729,7 +3837,7 @@
           <a:p>
             <a:fld id="{57871EFB-7B9E-4E86-A89E-697E8EBB06F2}" type="slidenum">
               <a:rPr lang="en-US" smtClean="0"/>
-              <a:t>‹#›</a:t>
+              <a:t>‹Nr.›</a:t>
             </a:fld>
             <a:endParaRPr lang="en-US"/>
           </a:p>
@@ -4097,7 +4205,7 @@
           <a:p>
             <a:fld id="{326951E3-958F-4611-B170-D081BA0250F9}" type="datetimeFigureOut">
               <a:rPr lang="en-US" smtClean="0"/>
-              <a:t>11/25/2022</a:t>
+              <a:t>1/26/2023</a:t>
             </a:fld>
             <a:endParaRPr lang="en-US"/>
           </a:p>
@@ -4151,7 +4259,7 @@
           <a:p>
             <a:fld id="{57871EFB-7B9E-4E86-A89E-697E8EBB06F2}" type="slidenum">
               <a:rPr lang="en-US" smtClean="0"/>
-              <a:t>‹#›</a:t>
+              <a:t>‹Nr.›</a:t>
             </a:fld>
             <a:endParaRPr lang="en-US"/>
           </a:p>
@@ -4249,7 +4357,7 @@
           <a:p>
             <a:fld id="{326951E3-958F-4611-B170-D081BA0250F9}" type="datetimeFigureOut">
               <a:rPr lang="en-US" smtClean="0"/>
-              <a:t>11/25/2022</a:t>
+              <a:t>1/26/2023</a:t>
             </a:fld>
             <a:endParaRPr lang="en-US"/>
           </a:p>
@@ -4303,7 +4411,7 @@
           <a:p>
             <a:fld id="{57871EFB-7B9E-4E86-A89E-697E8EBB06F2}" type="slidenum">
               <a:rPr lang="en-US" smtClean="0"/>
-              <a:t>‹#›</a:t>
+              <a:t>‹Nr.›</a:t>
             </a:fld>
             <a:endParaRPr lang="en-US"/>
           </a:p>
@@ -4362,7 +4470,7 @@
           <a:p>
             <a:fld id="{326951E3-958F-4611-B170-D081BA0250F9}" type="datetimeFigureOut">
               <a:rPr lang="en-US" smtClean="0"/>
-              <a:t>11/25/2022</a:t>
+              <a:t>1/26/2023</a:t>
             </a:fld>
             <a:endParaRPr lang="en-US"/>
           </a:p>
@@ -4416,7 +4524,7 @@
           <a:p>
             <a:fld id="{57871EFB-7B9E-4E86-A89E-697E8EBB06F2}" type="slidenum">
               <a:rPr lang="en-US" smtClean="0"/>
-              <a:t>‹#›</a:t>
+              <a:t>‹Nr.›</a:t>
             </a:fld>
             <a:endParaRPr lang="en-US"/>
           </a:p>
@@ -4680,7 +4788,7 @@
           <a:p>
             <a:fld id="{326951E3-958F-4611-B170-D081BA0250F9}" type="datetimeFigureOut">
               <a:rPr lang="en-US" smtClean="0"/>
-              <a:t>11/25/2022</a:t>
+              <a:t>1/26/2023</a:t>
             </a:fld>
             <a:endParaRPr lang="en-US"/>
           </a:p>
@@ -4734,7 +4842,7 @@
           <a:p>
             <a:fld id="{57871EFB-7B9E-4E86-A89E-697E8EBB06F2}" type="slidenum">
               <a:rPr lang="en-US" smtClean="0"/>
-              <a:t>‹#›</a:t>
+              <a:t>‹Nr.›</a:t>
             </a:fld>
             <a:endParaRPr lang="en-US"/>
           </a:p>
@@ -5016,7 +5124,7 @@
           <a:p>
             <a:fld id="{326951E3-958F-4611-B170-D081BA0250F9}" type="datetimeFigureOut">
               <a:rPr lang="en-US" smtClean="0"/>
-              <a:t>11/25/2022</a:t>
+              <a:t>1/26/2023</a:t>
             </a:fld>
             <a:endParaRPr lang="en-US"/>
           </a:p>
@@ -5070,7 +5178,7 @@
           <a:p>
             <a:fld id="{57871EFB-7B9E-4E86-A89E-697E8EBB06F2}" type="slidenum">
               <a:rPr lang="en-US" smtClean="0"/>
-              <a:t>‹#›</a:t>
+              <a:t>‹Nr.›</a:t>
             </a:fld>
             <a:endParaRPr lang="en-US"/>
           </a:p>
@@ -5305,7 +5413,7 @@
             <a:fld id="{326951E3-958F-4611-B170-D081BA0250F9}" type="datetimeFigureOut">
               <a:rPr lang="en-US" smtClean="0"/>
               <a:pPr/>
-              <a:t>11/25/2022</a:t>
+              <a:t>1/26/2023</a:t>
             </a:fld>
             <a:endParaRPr lang="en-US" dirty="0"/>
           </a:p>
@@ -5392,7 +5500,7 @@
             <a:fld id="{57871EFB-7B9E-4E86-A89E-697E8EBB06F2}" type="slidenum">
               <a:rPr lang="en-US" smtClean="0"/>
               <a:pPr/>
-              <a:t>‹#›</a:t>
+              <a:t>‹Nr.›</a:t>
             </a:fld>
             <a:endParaRPr lang="en-US" dirty="0"/>
           </a:p>
@@ -8521,6 +8629,36 @@
           <a:chExt cx="0" cy="0"/>
         </a:xfrm>
       </p:grpSpPr>
+      <p:pic>
+        <p:nvPicPr>
+          <p:cNvPr id="3" name="Grafik 2">
+            <a:extLst>
+              <a:ext uri="{FF2B5EF4-FFF2-40B4-BE49-F238E27FC236}">
+                <a16:creationId xmlns:a16="http://schemas.microsoft.com/office/drawing/2014/main" id="{DE823BE1-B315-B841-9B0C-8779D3318B35}"/>
+              </a:ext>
+            </a:extLst>
+          </p:cNvPr>
+          <p:cNvPicPr>
+            <a:picLocks noChangeAspect="1"/>
+          </p:cNvPicPr>
+          <p:nvPr/>
+        </p:nvPicPr>
+        <p:blipFill>
+          <a:blip r:embed="rId2"/>
+          <a:stretch>
+            <a:fillRect/>
+          </a:stretch>
+        </p:blipFill>
+        <p:spPr>
+          <a:xfrm>
+            <a:off x="0" y="834136"/>
+            <a:ext cx="12192000" cy="5715932"/>
+          </a:xfrm>
+          <a:prstGeom prst="rect">
+            <a:avLst/>
+          </a:prstGeom>
+        </p:spPr>
+      </p:pic>
       <p:sp>
         <p:nvSpPr>
           <p:cNvPr id="8" name="Title 1">
@@ -8570,42 +8708,13 @@
           <a:p>
             <a:pPr algn="ctr"/>
             <a:r>
-              <a:rPr lang="de-AT" b="1" dirty="0"/>
+              <a:rPr lang="de-AT" b="1"/>
               <a:t>Grafana Dashboard</a:t>
             </a:r>
+            <a:endParaRPr lang="de-AT" b="1" dirty="0"/>
           </a:p>
         </p:txBody>
       </p:sp>
-      <p:pic>
-        <p:nvPicPr>
-          <p:cNvPr id="7" name="Picture 6">
-            <a:extLst>
-              <a:ext uri="{FF2B5EF4-FFF2-40B4-BE49-F238E27FC236}">
-                <a16:creationId xmlns:a16="http://schemas.microsoft.com/office/drawing/2014/main" id="{9E46624F-803D-EEC3-77DD-BEF9C56E9269}"/>
-              </a:ext>
-            </a:extLst>
-          </p:cNvPr>
-          <p:cNvPicPr>
-            <a:picLocks noChangeAspect="1"/>
-          </p:cNvPicPr>
-          <p:nvPr/>
-        </p:nvPicPr>
-        <p:blipFill>
-          <a:blip r:embed="rId2"/>
-          <a:stretch>
-            <a:fillRect/>
-          </a:stretch>
-        </p:blipFill>
-        <p:spPr>
-          <a:xfrm>
-            <a:off x="0" y="1045718"/>
-            <a:ext cx="12192000" cy="4766564"/>
-          </a:xfrm>
-          <a:prstGeom prst="rect">
-            <a:avLst/>
-          </a:prstGeom>
-        </p:spPr>
-      </p:pic>
     </p:spTree>
     <p:extLst>
       <p:ext uri="{BB962C8B-B14F-4D97-AF65-F5344CB8AC3E}">
@@ -10461,10 +10570,11 @@
       </p:grpSpPr>
       <p:pic>
         <p:nvPicPr>
-          <p:cNvPr id="5" name="Picture 4">
-            <a:extLst>
-              <a:ext uri="{FF2B5EF4-FFF2-40B4-BE49-F238E27FC236}">
-                <a16:creationId xmlns:a16="http://schemas.microsoft.com/office/drawing/2014/main" id="{F6BCF78B-35EF-70AF-0A79-B209EE7D00E4}"/>
+          <p:cNvPr id="2" name="Grafik 1">
+            <a:hlinkClick r:id="rId2"/>
+            <a:extLst>
+              <a:ext uri="{FF2B5EF4-FFF2-40B4-BE49-F238E27FC236}">
+                <a16:creationId xmlns:a16="http://schemas.microsoft.com/office/drawing/2014/main" id="{ECD144AF-C713-4AA6-F670-0AA758C90973}"/>
               </a:ext>
             </a:extLst>
           </p:cNvPr>
@@ -10474,15 +10584,15 @@
           <p:nvPr/>
         </p:nvPicPr>
         <p:blipFill>
-          <a:blip r:embed="rId2"/>
+          <a:blip r:embed="rId3"/>
           <a:stretch>
             <a:fillRect/>
           </a:stretch>
         </p:blipFill>
         <p:spPr>
           <a:xfrm>
-            <a:off x="0" y="0"/>
-            <a:ext cx="12192000" cy="6858000"/>
+            <a:off x="71433" y="453226"/>
+            <a:ext cx="12049133" cy="5823749"/>
           </a:xfrm>
           <a:prstGeom prst="rect">
             <a:avLst/>
@@ -10603,48 +10713,6 @@
   <p:transition spd="slow">
     <p:cover/>
   </p:transition>
-</p:sld>
-</file>
-
-<file path=ppt/slides/slide18.xml><?xml version="1.0" encoding="utf-8"?>
-<p:sld xmlns:a="http://schemas.openxmlformats.org/drawingml/2006/main" xmlns:r="http://schemas.openxmlformats.org/officeDocument/2006/relationships" xmlns:p="http://schemas.openxmlformats.org/presentationml/2006/main">
-  <p:cSld>
-    <p:spTree>
-      <p:nvGrpSpPr>
-        <p:cNvPr id="1" name=""/>
-        <p:cNvGrpSpPr/>
-        <p:nvPr/>
-      </p:nvGrpSpPr>
-      <p:grpSpPr>
-        <a:xfrm>
-          <a:off x="0" y="0"/>
-          <a:ext cx="0" cy="0"/>
-          <a:chOff x="0" y="0"/>
-          <a:chExt cx="0" cy="0"/>
-        </a:xfrm>
-      </p:grpSpPr>
-    </p:spTree>
-    <p:extLst>
-      <p:ext uri="{BB962C8B-B14F-4D97-AF65-F5344CB8AC3E}">
-        <p14:creationId xmlns:p14="http://schemas.microsoft.com/office/powerpoint/2010/main" val="1509675491"/>
-      </p:ext>
-    </p:extLst>
-  </p:cSld>
-  <p:clrMapOvr>
-    <a:masterClrMapping/>
-  </p:clrMapOvr>
-  <mc:AlternateContent xmlns:mc="http://schemas.openxmlformats.org/markup-compatibility/2006">
-    <mc:Choice xmlns:p15="http://schemas.microsoft.com/office/powerpoint/2012/main" Requires="p15">
-      <p:transition xmlns:p14="http://schemas.microsoft.com/office/powerpoint/2010/main" spd="slow" p14:dur="1250">
-        <p15:prstTrans prst="airplane"/>
-      </p:transition>
-    </mc:Choice>
-    <mc:Fallback>
-      <p:transition spd="slow">
-        <p:fade/>
-      </p:transition>
-    </mc:Fallback>
-  </mc:AlternateContent>
 </p:sld>
 </file>
 
@@ -13375,13 +13443,13 @@
   <p:clrMapOvr>
     <a:masterClrMapping/>
   </p:clrMapOvr>
-  <mc:AlternateContent xmlns:mc="http://schemas.openxmlformats.org/markup-compatibility/2006">
-    <mc:Choice xmlns:p14="http://schemas.microsoft.com/office/powerpoint/2010/main" Requires="p14">
+  <mc:AlternateContent xmlns:mc="http://schemas.openxmlformats.org/markup-compatibility/2006" xmlns:p14="http://schemas.microsoft.com/office/powerpoint/2010/main">
+    <mc:Choice Requires="p14">
       <p:transition spd="slow">
         <p14:pan dir="u"/>
       </p:transition>
     </mc:Choice>
-    <mc:Fallback>
+    <mc:Fallback xmlns="">
       <p:transition spd="slow">
         <p:fade/>
       </p:transition>

</xml_diff>